<commit_message>
Added related work, new derivations and revised notation
</commit_message>
<xml_diff>
--- a/paper_figures.pptx
+++ b/paper_figures.pptx
@@ -7,6 +7,10 @@
   <p:sldIdLst>
     <p:sldId id="256" r:id="rId2"/>
     <p:sldId id="257" r:id="rId3"/>
+    <p:sldId id="261" r:id="rId4"/>
+    <p:sldId id="258" r:id="rId5"/>
+    <p:sldId id="259" r:id="rId6"/>
+    <p:sldId id="260" r:id="rId7"/>
   </p:sldIdLst>
   <p:sldSz cx="9144000" cy="6858000" type="screen4x3"/>
   <p:notesSz cx="6858000" cy="9144000"/>
@@ -289,7 +293,7 @@
           <a:p>
             <a:fld id="{652B95B1-0645-6345-9251-BB6C535BA899}" type="datetimeFigureOut">
               <a:rPr lang="en-US" smtClean="0"/>
-              <a:t>7/13/14</a:t>
+              <a:t>7/29/14</a:t>
             </a:fld>
             <a:endParaRPr lang="en-US"/>
           </a:p>
@@ -459,7 +463,7 @@
           <a:p>
             <a:fld id="{652B95B1-0645-6345-9251-BB6C535BA899}" type="datetimeFigureOut">
               <a:rPr lang="en-US" smtClean="0"/>
-              <a:t>7/13/14</a:t>
+              <a:t>7/29/14</a:t>
             </a:fld>
             <a:endParaRPr lang="en-US"/>
           </a:p>
@@ -639,7 +643,7 @@
           <a:p>
             <a:fld id="{652B95B1-0645-6345-9251-BB6C535BA899}" type="datetimeFigureOut">
               <a:rPr lang="en-US" smtClean="0"/>
-              <a:t>7/13/14</a:t>
+              <a:t>7/29/14</a:t>
             </a:fld>
             <a:endParaRPr lang="en-US"/>
           </a:p>
@@ -809,7 +813,7 @@
           <a:p>
             <a:fld id="{652B95B1-0645-6345-9251-BB6C535BA899}" type="datetimeFigureOut">
               <a:rPr lang="en-US" smtClean="0"/>
-              <a:t>7/13/14</a:t>
+              <a:t>7/29/14</a:t>
             </a:fld>
             <a:endParaRPr lang="en-US"/>
           </a:p>
@@ -1055,7 +1059,7 @@
           <a:p>
             <a:fld id="{652B95B1-0645-6345-9251-BB6C535BA899}" type="datetimeFigureOut">
               <a:rPr lang="en-US" smtClean="0"/>
-              <a:t>7/13/14</a:t>
+              <a:t>7/29/14</a:t>
             </a:fld>
             <a:endParaRPr lang="en-US"/>
           </a:p>
@@ -1343,7 +1347,7 @@
           <a:p>
             <a:fld id="{652B95B1-0645-6345-9251-BB6C535BA899}" type="datetimeFigureOut">
               <a:rPr lang="en-US" smtClean="0"/>
-              <a:t>7/13/14</a:t>
+              <a:t>7/29/14</a:t>
             </a:fld>
             <a:endParaRPr lang="en-US"/>
           </a:p>
@@ -1765,7 +1769,7 @@
           <a:p>
             <a:fld id="{652B95B1-0645-6345-9251-BB6C535BA899}" type="datetimeFigureOut">
               <a:rPr lang="en-US" smtClean="0"/>
-              <a:t>7/13/14</a:t>
+              <a:t>7/29/14</a:t>
             </a:fld>
             <a:endParaRPr lang="en-US"/>
           </a:p>
@@ -1883,7 +1887,7 @@
           <a:p>
             <a:fld id="{652B95B1-0645-6345-9251-BB6C535BA899}" type="datetimeFigureOut">
               <a:rPr lang="en-US" smtClean="0"/>
-              <a:t>7/13/14</a:t>
+              <a:t>7/29/14</a:t>
             </a:fld>
             <a:endParaRPr lang="en-US"/>
           </a:p>
@@ -1978,7 +1982,7 @@
           <a:p>
             <a:fld id="{652B95B1-0645-6345-9251-BB6C535BA899}" type="datetimeFigureOut">
               <a:rPr lang="en-US" smtClean="0"/>
-              <a:t>7/13/14</a:t>
+              <a:t>7/29/14</a:t>
             </a:fld>
             <a:endParaRPr lang="en-US"/>
           </a:p>
@@ -2255,7 +2259,7 @@
           <a:p>
             <a:fld id="{652B95B1-0645-6345-9251-BB6C535BA899}" type="datetimeFigureOut">
               <a:rPr lang="en-US" smtClean="0"/>
-              <a:t>7/13/14</a:t>
+              <a:t>7/29/14</a:t>
             </a:fld>
             <a:endParaRPr lang="en-US"/>
           </a:p>
@@ -2508,7 +2512,7 @@
           <a:p>
             <a:fld id="{652B95B1-0645-6345-9251-BB6C535BA899}" type="datetimeFigureOut">
               <a:rPr lang="en-US" smtClean="0"/>
-              <a:t>7/13/14</a:t>
+              <a:t>7/29/14</a:t>
             </a:fld>
             <a:endParaRPr lang="en-US"/>
           </a:p>
@@ -2721,7 +2725,7 @@
           <a:p>
             <a:fld id="{652B95B1-0645-6345-9251-BB6C535BA899}" type="datetimeFigureOut">
               <a:rPr lang="en-US" smtClean="0"/>
-              <a:t>7/13/14</a:t>
+              <a:t>7/29/14</a:t>
             </a:fld>
             <a:endParaRPr lang="en-US"/>
           </a:p>
@@ -3428,6 +3432,310 @@
     <p:extLst>
       <p:ext uri="{BB962C8B-B14F-4D97-AF65-F5344CB8AC3E}">
         <p14:creationId xmlns:p14="http://schemas.microsoft.com/office/powerpoint/2010/main" val="2797079444"/>
+      </p:ext>
+    </p:extLst>
+  </p:cSld>
+  <p:clrMapOvr>
+    <a:masterClrMapping/>
+  </p:clrMapOvr>
+</p:sld>
+</file>
+
+<file path=ppt/slides/slide3.xml><?xml version="1.0" encoding="utf-8"?>
+<p:sld xmlns:a="http://schemas.openxmlformats.org/drawingml/2006/main" xmlns:r="http://schemas.openxmlformats.org/officeDocument/2006/relationships" xmlns:p="http://schemas.openxmlformats.org/presentationml/2006/main">
+  <p:cSld>
+    <p:spTree>
+      <p:nvGrpSpPr>
+        <p:cNvPr id="1" name=""/>
+        <p:cNvGrpSpPr/>
+        <p:nvPr/>
+      </p:nvGrpSpPr>
+      <p:grpSpPr>
+        <a:xfrm>
+          <a:off x="0" y="0"/>
+          <a:ext cx="0" cy="0"/>
+          <a:chOff x="0" y="0"/>
+          <a:chExt cx="0" cy="0"/>
+        </a:xfrm>
+      </p:grpSpPr>
+      <p:pic>
+        <p:nvPicPr>
+          <p:cNvPr id="2" name="Picture 1"/>
+          <p:cNvPicPr>
+            <a:picLocks noChangeAspect="1"/>
+          </p:cNvPicPr>
+          <p:nvPr/>
+        </p:nvPicPr>
+        <p:blipFill>
+          <a:blip r:embed="rId2"/>
+          <a:stretch>
+            <a:fillRect/>
+          </a:stretch>
+        </p:blipFill>
+        <p:spPr>
+          <a:xfrm>
+            <a:off x="2240325" y="338667"/>
+            <a:ext cx="5252676" cy="5813778"/>
+          </a:xfrm>
+          <a:prstGeom prst="rect">
+            <a:avLst/>
+          </a:prstGeom>
+        </p:spPr>
+      </p:pic>
+    </p:spTree>
+    <p:extLst>
+      <p:ext uri="{BB962C8B-B14F-4D97-AF65-F5344CB8AC3E}">
+        <p14:creationId xmlns:p14="http://schemas.microsoft.com/office/powerpoint/2010/main" val="3277396404"/>
+      </p:ext>
+    </p:extLst>
+  </p:cSld>
+  <p:clrMapOvr>
+    <a:masterClrMapping/>
+  </p:clrMapOvr>
+</p:sld>
+</file>
+
+<file path=ppt/slides/slide4.xml><?xml version="1.0" encoding="utf-8"?>
+<p:sld xmlns:a="http://schemas.openxmlformats.org/drawingml/2006/main" xmlns:r="http://schemas.openxmlformats.org/officeDocument/2006/relationships" xmlns:p="http://schemas.openxmlformats.org/presentationml/2006/main">
+  <p:cSld>
+    <p:spTree>
+      <p:nvGrpSpPr>
+        <p:cNvPr id="1" name=""/>
+        <p:cNvGrpSpPr/>
+        <p:nvPr/>
+      </p:nvGrpSpPr>
+      <p:grpSpPr>
+        <a:xfrm>
+          <a:off x="0" y="0"/>
+          <a:ext cx="0" cy="0"/>
+          <a:chOff x="0" y="0"/>
+          <a:chExt cx="0" cy="0"/>
+        </a:xfrm>
+      </p:grpSpPr>
+      <p:pic>
+        <p:nvPicPr>
+          <p:cNvPr id="5" name="Picture 4"/>
+          <p:cNvPicPr>
+            <a:picLocks noChangeAspect="1"/>
+          </p:cNvPicPr>
+          <p:nvPr/>
+        </p:nvPicPr>
+        <p:blipFill rotWithShape="1">
+          <a:blip r:embed="rId2">
+            <a:extLst>
+              <a:ext uri="{BEBA8EAE-BF5A-486C-A8C5-ECC9F3942E4B}">
+                <a14:imgProps xmlns:a14="http://schemas.microsoft.com/office/drawing/2010/main">
+                  <a14:imgLayer r:embed="rId3">
+                    <a14:imgEffect>
+                      <a14:backgroundRemoval t="24236" b="63428" l="30856" r="62036">
+                        <a14:foregroundMark x1="30856" y1="30568" x2="30856" y2="30568"/>
+                        <a14:foregroundMark x1="33926" y1="30568" x2="33926" y2="30568"/>
+                      </a14:backgroundRemoval>
+                    </a14:imgEffect>
+                  </a14:imgLayer>
+                </a14:imgProps>
+              </a:ext>
+            </a:extLst>
+          </a:blip>
+          <a:srcRect l="29797" t="21373" r="34303" b="31805"/>
+          <a:stretch/>
+        </p:blipFill>
+        <p:spPr>
+          <a:xfrm>
+            <a:off x="550333" y="1016000"/>
+            <a:ext cx="3810000" cy="3676650"/>
+          </a:xfrm>
+          <a:prstGeom prst="rect">
+            <a:avLst/>
+          </a:prstGeom>
+        </p:spPr>
+      </p:pic>
+      <p:pic>
+        <p:nvPicPr>
+          <p:cNvPr id="6" name="Picture 5"/>
+          <p:cNvPicPr>
+            <a:picLocks noChangeAspect="1"/>
+          </p:cNvPicPr>
+          <p:nvPr/>
+        </p:nvPicPr>
+        <p:blipFill>
+          <a:blip r:embed="rId4"/>
+          <a:stretch>
+            <a:fillRect/>
+          </a:stretch>
+        </p:blipFill>
+        <p:spPr>
+          <a:xfrm>
+            <a:off x="4360333" y="1207206"/>
+            <a:ext cx="4647259" cy="3485444"/>
+          </a:xfrm>
+          <a:prstGeom prst="rect">
+            <a:avLst/>
+          </a:prstGeom>
+        </p:spPr>
+      </p:pic>
+    </p:spTree>
+    <p:extLst>
+      <p:ext uri="{BB962C8B-B14F-4D97-AF65-F5344CB8AC3E}">
+        <p14:creationId xmlns:p14="http://schemas.microsoft.com/office/powerpoint/2010/main" val="3089009080"/>
+      </p:ext>
+    </p:extLst>
+  </p:cSld>
+  <p:clrMapOvr>
+    <a:masterClrMapping/>
+  </p:clrMapOvr>
+</p:sld>
+</file>
+
+<file path=ppt/slides/slide5.xml><?xml version="1.0" encoding="utf-8"?>
+<p:sld xmlns:a="http://schemas.openxmlformats.org/drawingml/2006/main" xmlns:r="http://schemas.openxmlformats.org/officeDocument/2006/relationships" xmlns:p="http://schemas.openxmlformats.org/presentationml/2006/main">
+  <p:cSld>
+    <p:spTree>
+      <p:nvGrpSpPr>
+        <p:cNvPr id="1" name=""/>
+        <p:cNvGrpSpPr/>
+        <p:nvPr/>
+      </p:nvGrpSpPr>
+      <p:grpSpPr>
+        <a:xfrm>
+          <a:off x="0" y="0"/>
+          <a:ext cx="0" cy="0"/>
+          <a:chOff x="0" y="0"/>
+          <a:chExt cx="0" cy="0"/>
+        </a:xfrm>
+      </p:grpSpPr>
+      <p:pic>
+        <p:nvPicPr>
+          <p:cNvPr id="2" name="Picture 1"/>
+          <p:cNvPicPr>
+            <a:picLocks noChangeAspect="1"/>
+          </p:cNvPicPr>
+          <p:nvPr/>
+        </p:nvPicPr>
+        <p:blipFill rotWithShape="1">
+          <a:blip r:embed="rId2">
+            <a:extLst>
+              <a:ext uri="{BEBA8EAE-BF5A-486C-A8C5-ECC9F3942E4B}">
+                <a14:imgProps xmlns:a14="http://schemas.microsoft.com/office/drawing/2010/main">
+                  <a14:imgLayer r:embed="rId3">
+                    <a14:imgEffect>
+                      <a14:backgroundRemoval t="24236" b="63428" l="30856" r="62036">
+                        <a14:foregroundMark x1="30856" y1="30568" x2="30856" y2="30568"/>
+                        <a14:foregroundMark x1="33926" y1="30568" x2="33926" y2="30568"/>
+                      </a14:backgroundRemoval>
+                    </a14:imgEffect>
+                  </a14:imgLayer>
+                </a14:imgProps>
+              </a:ext>
+            </a:extLst>
+          </a:blip>
+          <a:srcRect l="29797" t="21373" r="34303" b="31805"/>
+          <a:stretch/>
+        </p:blipFill>
+        <p:spPr>
+          <a:xfrm>
+            <a:off x="550333" y="1016000"/>
+            <a:ext cx="3810000" cy="3676650"/>
+          </a:xfrm>
+          <a:prstGeom prst="rect">
+            <a:avLst/>
+          </a:prstGeom>
+        </p:spPr>
+      </p:pic>
+      <p:pic>
+        <p:nvPicPr>
+          <p:cNvPr id="5" name="Picture 4"/>
+          <p:cNvPicPr>
+            <a:picLocks noChangeAspect="1"/>
+          </p:cNvPicPr>
+          <p:nvPr/>
+        </p:nvPicPr>
+        <p:blipFill>
+          <a:blip r:embed="rId4">
+            <a:extLst>
+              <a:ext uri="{BEBA8EAE-BF5A-486C-A8C5-ECC9F3942E4B}">
+                <a14:imgProps xmlns:a14="http://schemas.microsoft.com/office/drawing/2010/main">
+                  <a14:imgLayer r:embed="rId5">
+                    <a14:imgEffect>
+                      <a14:backgroundRemoval t="10000" b="90000" l="10000" r="90000"/>
+                    </a14:imgEffect>
+                  </a14:imgLayer>
+                </a14:imgProps>
+              </a:ext>
+            </a:extLst>
+          </a:blip>
+          <a:stretch>
+            <a:fillRect/>
+          </a:stretch>
+        </p:blipFill>
+        <p:spPr>
+          <a:xfrm>
+            <a:off x="3189111" y="155222"/>
+            <a:ext cx="7112000" cy="5334000"/>
+          </a:xfrm>
+          <a:prstGeom prst="rect">
+            <a:avLst/>
+          </a:prstGeom>
+        </p:spPr>
+      </p:pic>
+    </p:spTree>
+    <p:extLst>
+      <p:ext uri="{BB962C8B-B14F-4D97-AF65-F5344CB8AC3E}">
+        <p14:creationId xmlns:p14="http://schemas.microsoft.com/office/powerpoint/2010/main" val="1939089776"/>
+      </p:ext>
+    </p:extLst>
+  </p:cSld>
+  <p:clrMapOvr>
+    <a:masterClrMapping/>
+  </p:clrMapOvr>
+</p:sld>
+</file>
+
+<file path=ppt/slides/slide6.xml><?xml version="1.0" encoding="utf-8"?>
+<p:sld xmlns:a="http://schemas.openxmlformats.org/drawingml/2006/main" xmlns:r="http://schemas.openxmlformats.org/officeDocument/2006/relationships" xmlns:p="http://schemas.openxmlformats.org/presentationml/2006/main">
+  <p:cSld>
+    <p:spTree>
+      <p:nvGrpSpPr>
+        <p:cNvPr id="1" name=""/>
+        <p:cNvGrpSpPr/>
+        <p:nvPr/>
+      </p:nvGrpSpPr>
+      <p:grpSpPr>
+        <a:xfrm>
+          <a:off x="0" y="0"/>
+          <a:ext cx="0" cy="0"/>
+          <a:chOff x="0" y="0"/>
+          <a:chExt cx="0" cy="0"/>
+        </a:xfrm>
+      </p:grpSpPr>
+      <p:pic>
+        <p:nvPicPr>
+          <p:cNvPr id="4" name="Picture 3"/>
+          <p:cNvPicPr>
+            <a:picLocks noChangeAspect="1"/>
+          </p:cNvPicPr>
+          <p:nvPr/>
+        </p:nvPicPr>
+        <p:blipFill>
+          <a:blip r:embed="rId2"/>
+          <a:stretch>
+            <a:fillRect/>
+          </a:stretch>
+        </p:blipFill>
+        <p:spPr>
+          <a:xfrm>
+            <a:off x="1016000" y="762000"/>
+            <a:ext cx="7112000" cy="5334000"/>
+          </a:xfrm>
+          <a:prstGeom prst="rect">
+            <a:avLst/>
+          </a:prstGeom>
+        </p:spPr>
+      </p:pic>
+    </p:spTree>
+    <p:extLst>
+      <p:ext uri="{BB962C8B-B14F-4D97-AF65-F5344CB8AC3E}">
+        <p14:creationId xmlns:p14="http://schemas.microsoft.com/office/powerpoint/2010/main" val="1560528561"/>
       </p:ext>
     </p:extLst>
   </p:cSld>

</xml_diff>